<commit_message>
Konzept für UI ohne Navigationsleiste hinzugefügt
</commit_message>
<xml_diff>
--- a/Dokumentation/dokumentation.pptx
+++ b/Dokumentation/dokumentation.pptx
@@ -5,14 +5,15 @@
     <p:sldMasterId id="2147483648" r:id="rId1"/>
   </p:sldMasterIdLst>
   <p:notesMasterIdLst>
-    <p:notesMasterId r:id="rId7"/>
+    <p:notesMasterId r:id="rId8"/>
   </p:notesMasterIdLst>
   <p:sldIdLst>
     <p:sldId id="257" r:id="rId2"/>
     <p:sldId id="256" r:id="rId3"/>
     <p:sldId id="258" r:id="rId4"/>
     <p:sldId id="259" r:id="rId5"/>
-    <p:sldId id="260" r:id="rId6"/>
+    <p:sldId id="261" r:id="rId6"/>
+    <p:sldId id="260" r:id="rId7"/>
   </p:sldIdLst>
   <p:sldSz cx="12192000" cy="6858000"/>
   <p:notesSz cx="6858000" cy="9144000"/>
@@ -213,7 +214,7 @@
           <a:p>
             <a:fld id="{F1CAF840-27E4-4239-B411-7319B5DE6B82}" type="datetimeFigureOut">
               <a:rPr lang="de-DE" smtClean="0"/>
-              <a:t>07.05.2020</a:t>
+              <a:t>08.05.2020</a:t>
             </a:fld>
             <a:endParaRPr lang="de-DE"/>
           </a:p>
@@ -627,7 +628,7 @@
           <a:p>
             <a:fld id="{723101A8-F6CA-47F5-8A07-6FC06EC7AF15}" type="datetimeFigureOut">
               <a:rPr lang="de-DE" smtClean="0"/>
-              <a:t>07.05.2020</a:t>
+              <a:t>08.05.2020</a:t>
             </a:fld>
             <a:endParaRPr lang="de-DE"/>
           </a:p>
@@ -825,7 +826,7 @@
           <a:p>
             <a:fld id="{723101A8-F6CA-47F5-8A07-6FC06EC7AF15}" type="datetimeFigureOut">
               <a:rPr lang="de-DE" smtClean="0"/>
-              <a:t>07.05.2020</a:t>
+              <a:t>08.05.2020</a:t>
             </a:fld>
             <a:endParaRPr lang="de-DE"/>
           </a:p>
@@ -1033,7 +1034,7 @@
           <a:p>
             <a:fld id="{723101A8-F6CA-47F5-8A07-6FC06EC7AF15}" type="datetimeFigureOut">
               <a:rPr lang="de-DE" smtClean="0"/>
-              <a:t>07.05.2020</a:t>
+              <a:t>08.05.2020</a:t>
             </a:fld>
             <a:endParaRPr lang="de-DE"/>
           </a:p>
@@ -1231,7 +1232,7 @@
           <a:p>
             <a:fld id="{723101A8-F6CA-47F5-8A07-6FC06EC7AF15}" type="datetimeFigureOut">
               <a:rPr lang="de-DE" smtClean="0"/>
-              <a:t>07.05.2020</a:t>
+              <a:t>08.05.2020</a:t>
             </a:fld>
             <a:endParaRPr lang="de-DE"/>
           </a:p>
@@ -1506,7 +1507,7 @@
           <a:p>
             <a:fld id="{723101A8-F6CA-47F5-8A07-6FC06EC7AF15}" type="datetimeFigureOut">
               <a:rPr lang="de-DE" smtClean="0"/>
-              <a:t>07.05.2020</a:t>
+              <a:t>08.05.2020</a:t>
             </a:fld>
             <a:endParaRPr lang="de-DE"/>
           </a:p>
@@ -1771,7 +1772,7 @@
           <a:p>
             <a:fld id="{723101A8-F6CA-47F5-8A07-6FC06EC7AF15}" type="datetimeFigureOut">
               <a:rPr lang="de-DE" smtClean="0"/>
-              <a:t>07.05.2020</a:t>
+              <a:t>08.05.2020</a:t>
             </a:fld>
             <a:endParaRPr lang="de-DE"/>
           </a:p>
@@ -2183,7 +2184,7 @@
           <a:p>
             <a:fld id="{723101A8-F6CA-47F5-8A07-6FC06EC7AF15}" type="datetimeFigureOut">
               <a:rPr lang="de-DE" smtClean="0"/>
-              <a:t>07.05.2020</a:t>
+              <a:t>08.05.2020</a:t>
             </a:fld>
             <a:endParaRPr lang="de-DE"/>
           </a:p>
@@ -2324,7 +2325,7 @@
           <a:p>
             <a:fld id="{723101A8-F6CA-47F5-8A07-6FC06EC7AF15}" type="datetimeFigureOut">
               <a:rPr lang="de-DE" smtClean="0"/>
-              <a:t>07.05.2020</a:t>
+              <a:t>08.05.2020</a:t>
             </a:fld>
             <a:endParaRPr lang="de-DE"/>
           </a:p>
@@ -2437,7 +2438,7 @@
           <a:p>
             <a:fld id="{723101A8-F6CA-47F5-8A07-6FC06EC7AF15}" type="datetimeFigureOut">
               <a:rPr lang="de-DE" smtClean="0"/>
-              <a:t>07.05.2020</a:t>
+              <a:t>08.05.2020</a:t>
             </a:fld>
             <a:endParaRPr lang="de-DE"/>
           </a:p>
@@ -2748,7 +2749,7 @@
           <a:p>
             <a:fld id="{723101A8-F6CA-47F5-8A07-6FC06EC7AF15}" type="datetimeFigureOut">
               <a:rPr lang="de-DE" smtClean="0"/>
-              <a:t>07.05.2020</a:t>
+              <a:t>08.05.2020</a:t>
             </a:fld>
             <a:endParaRPr lang="de-DE"/>
           </a:p>
@@ -3036,7 +3037,7 @@
           <a:p>
             <a:fld id="{723101A8-F6CA-47F5-8A07-6FC06EC7AF15}" type="datetimeFigureOut">
               <a:rPr lang="de-DE" smtClean="0"/>
-              <a:t>07.05.2020</a:t>
+              <a:t>08.05.2020</a:t>
             </a:fld>
             <a:endParaRPr lang="de-DE"/>
           </a:p>
@@ -3277,7 +3278,7 @@
           <a:p>
             <a:fld id="{723101A8-F6CA-47F5-8A07-6FC06EC7AF15}" type="datetimeFigureOut">
               <a:rPr lang="de-DE" smtClean="0"/>
-              <a:t>07.05.2020</a:t>
+              <a:t>08.05.2020</a:t>
             </a:fld>
             <a:endParaRPr lang="de-DE"/>
           </a:p>
@@ -5647,8 +5648,8 @@
         </p:nvSpPr>
         <p:spPr>
           <a:xfrm rot="1226112">
-            <a:off x="3547898" y="3522356"/>
-            <a:ext cx="7324681" cy="1293275"/>
+            <a:off x="2937905" y="2844224"/>
+            <a:ext cx="6374694" cy="1169551"/>
           </a:xfrm>
           <a:prstGeom prst="rect">
             <a:avLst/>
@@ -5662,7 +5663,7 @@
           <a:lstStyle/>
           <a:p>
             <a:r>
-              <a:rPr lang="de-DE" sz="5000" dirty="0">
+              <a:rPr lang="de-DE" sz="7000" dirty="0">
                 <a:solidFill>
                   <a:schemeClr val="bg1">
                     <a:lumMod val="65000"/>
@@ -6218,6 +6219,815 @@
 </file>
 
 <file path=ppt/slides/slide5.xml><?xml version="1.0" encoding="utf-8"?>
+<p:sld xmlns:a="http://schemas.openxmlformats.org/drawingml/2006/main" xmlns:r="http://schemas.openxmlformats.org/officeDocument/2006/relationships" xmlns:p="http://schemas.openxmlformats.org/presentationml/2006/main">
+  <p:cSld>
+    <p:spTree>
+      <p:nvGrpSpPr>
+        <p:cNvPr id="1" name=""/>
+        <p:cNvGrpSpPr/>
+        <p:nvPr/>
+      </p:nvGrpSpPr>
+      <p:grpSpPr>
+        <a:xfrm>
+          <a:off x="0" y="0"/>
+          <a:ext cx="0" cy="0"/>
+          <a:chOff x="0" y="0"/>
+          <a:chExt cx="0" cy="0"/>
+        </a:xfrm>
+      </p:grpSpPr>
+      <p:sp>
+        <p:nvSpPr>
+          <p:cNvPr id="4" name="Rechteck 3">
+            <a:extLst>
+              <a:ext uri="{FF2B5EF4-FFF2-40B4-BE49-F238E27FC236}">
+                <a16:creationId xmlns:a16="http://schemas.microsoft.com/office/drawing/2014/main" id="{C6021245-747C-4811-8913-F4B50D87E5C6}"/>
+              </a:ext>
+            </a:extLst>
+          </p:cNvPr>
+          <p:cNvSpPr/>
+          <p:nvPr/>
+        </p:nvSpPr>
+        <p:spPr>
+          <a:xfrm>
+            <a:off x="0" y="8677"/>
+            <a:ext cx="12192000" cy="6849323"/>
+          </a:xfrm>
+          <a:prstGeom prst="rect">
+            <a:avLst/>
+          </a:prstGeom>
+          <a:noFill/>
+          <a:ln>
+            <a:solidFill>
+              <a:schemeClr val="tx1"/>
+            </a:solidFill>
+          </a:ln>
+        </p:spPr>
+        <p:style>
+          <a:lnRef idx="2">
+            <a:schemeClr val="accent1">
+              <a:shade val="50000"/>
+            </a:schemeClr>
+          </a:lnRef>
+          <a:fillRef idx="1">
+            <a:schemeClr val="accent1"/>
+          </a:fillRef>
+          <a:effectRef idx="0">
+            <a:schemeClr val="accent1"/>
+          </a:effectRef>
+          <a:fontRef idx="minor">
+            <a:schemeClr val="lt1"/>
+          </a:fontRef>
+        </p:style>
+        <p:txBody>
+          <a:bodyPr rtlCol="0" anchor="ctr"/>
+          <a:lstStyle/>
+          <a:p>
+            <a:pPr algn="ctr"/>
+            <a:endParaRPr lang="de-DE"/>
+          </a:p>
+        </p:txBody>
+      </p:sp>
+      <p:cxnSp>
+        <p:nvCxnSpPr>
+          <p:cNvPr id="6" name="Gerader Verbinder 5">
+            <a:extLst>
+              <a:ext uri="{FF2B5EF4-FFF2-40B4-BE49-F238E27FC236}">
+                <a16:creationId xmlns:a16="http://schemas.microsoft.com/office/drawing/2014/main" id="{A98911BE-77E5-4333-9782-7B2B23C74B1D}"/>
+              </a:ext>
+            </a:extLst>
+          </p:cNvPr>
+          <p:cNvCxnSpPr>
+            <a:cxnSpLocks/>
+          </p:cNvCxnSpPr>
+          <p:nvPr/>
+        </p:nvCxnSpPr>
+        <p:spPr>
+          <a:xfrm>
+            <a:off x="0" y="1070679"/>
+            <a:ext cx="12192000" cy="0"/>
+          </a:xfrm>
+          <a:prstGeom prst="line">
+            <a:avLst/>
+          </a:prstGeom>
+          <a:ln w="12700">
+            <a:solidFill>
+              <a:schemeClr val="tx1"/>
+            </a:solidFill>
+          </a:ln>
+        </p:spPr>
+        <p:style>
+          <a:lnRef idx="1">
+            <a:schemeClr val="accent1"/>
+          </a:lnRef>
+          <a:fillRef idx="0">
+            <a:schemeClr val="accent1"/>
+          </a:fillRef>
+          <a:effectRef idx="0">
+            <a:schemeClr val="accent1"/>
+          </a:effectRef>
+          <a:fontRef idx="minor">
+            <a:schemeClr val="tx1"/>
+          </a:fontRef>
+        </p:style>
+      </p:cxnSp>
+      <p:grpSp>
+        <p:nvGrpSpPr>
+          <p:cNvPr id="2" name="Gruppieren 1">
+            <a:extLst>
+              <a:ext uri="{FF2B5EF4-FFF2-40B4-BE49-F238E27FC236}">
+                <a16:creationId xmlns:a16="http://schemas.microsoft.com/office/drawing/2014/main" id="{E09B40F5-38F8-4CC2-8890-2CDD588F2EE0}"/>
+              </a:ext>
+            </a:extLst>
+          </p:cNvPr>
+          <p:cNvGrpSpPr/>
+          <p:nvPr/>
+        </p:nvGrpSpPr>
+        <p:grpSpPr>
+          <a:xfrm rot="16200000">
+            <a:off x="204098" y="83567"/>
+            <a:ext cx="872541" cy="912221"/>
+            <a:chOff x="164720" y="134486"/>
+            <a:chExt cx="934697" cy="810380"/>
+          </a:xfrm>
+        </p:grpSpPr>
+        <p:sp>
+          <p:nvSpPr>
+            <p:cNvPr id="11" name="Textfeld 10">
+              <a:extLst>
+                <a:ext uri="{FF2B5EF4-FFF2-40B4-BE49-F238E27FC236}">
+                  <a16:creationId xmlns:a16="http://schemas.microsoft.com/office/drawing/2014/main" id="{3A3FABB5-A5BC-4412-A231-BB2E35871ADA}"/>
+                </a:ext>
+              </a:extLst>
+            </p:cNvPr>
+            <p:cNvSpPr txBox="1">
+              <a:spLocks/>
+            </p:cNvSpPr>
+            <p:nvPr/>
+          </p:nvSpPr>
+          <p:spPr>
+            <a:xfrm>
+              <a:off x="164720" y="134486"/>
+              <a:ext cx="934697" cy="810380"/>
+            </a:xfrm>
+            <a:prstGeom prst="rect">
+              <a:avLst/>
+            </a:prstGeom>
+            <a:solidFill>
+              <a:schemeClr val="bg1">
+                <a:lumMod val="85000"/>
+              </a:schemeClr>
+            </a:solidFill>
+            <a:ln>
+              <a:solidFill>
+                <a:schemeClr val="tx1"/>
+              </a:solidFill>
+            </a:ln>
+          </p:spPr>
+          <p:txBody>
+            <a:bodyPr wrap="square" rtlCol="0" anchor="ctr" anchorCtr="0">
+              <a:noAutofit/>
+            </a:bodyPr>
+            <a:lstStyle/>
+            <a:p>
+              <a:pPr algn="ctr"/>
+              <a:endParaRPr lang="de-DE" dirty="0"/>
+            </a:p>
+          </p:txBody>
+        </p:sp>
+        <p:grpSp>
+          <p:nvGrpSpPr>
+            <p:cNvPr id="14" name="Gruppieren 13">
+              <a:extLst>
+                <a:ext uri="{FF2B5EF4-FFF2-40B4-BE49-F238E27FC236}">
+                  <a16:creationId xmlns:a16="http://schemas.microsoft.com/office/drawing/2014/main" id="{595801BA-C827-46D6-828B-AF388A320A48}"/>
+                </a:ext>
+              </a:extLst>
+            </p:cNvPr>
+            <p:cNvGrpSpPr/>
+            <p:nvPr/>
+          </p:nvGrpSpPr>
+          <p:grpSpPr>
+            <a:xfrm>
+              <a:off x="374898" y="202736"/>
+              <a:ext cx="532925" cy="638406"/>
+              <a:chOff x="2832872" y="876736"/>
+              <a:chExt cx="334692" cy="425403"/>
+            </a:xfrm>
+            <a:solidFill>
+              <a:schemeClr val="tx1">
+                <a:lumMod val="50000"/>
+                <a:lumOff val="50000"/>
+              </a:schemeClr>
+            </a:solidFill>
+          </p:grpSpPr>
+          <p:sp>
+            <p:nvSpPr>
+              <p:cNvPr id="12" name="Rechteck 11">
+                <a:extLst>
+                  <a:ext uri="{FF2B5EF4-FFF2-40B4-BE49-F238E27FC236}">
+                    <a16:creationId xmlns:a16="http://schemas.microsoft.com/office/drawing/2014/main" id="{DE0A528F-9AB2-4FFB-B5A0-86BEF42EF6DC}"/>
+                  </a:ext>
+                </a:extLst>
+              </p:cNvPr>
+              <p:cNvSpPr/>
+              <p:nvPr/>
+            </p:nvSpPr>
+            <p:spPr>
+              <a:xfrm>
+                <a:off x="2912953" y="1044836"/>
+                <a:ext cx="164854" cy="257303"/>
+              </a:xfrm>
+              <a:prstGeom prst="rect">
+                <a:avLst/>
+              </a:prstGeom>
+              <a:grpFill/>
+              <a:ln>
+                <a:solidFill>
+                  <a:schemeClr val="tx1"/>
+                </a:solidFill>
+              </a:ln>
+            </p:spPr>
+            <p:style>
+              <a:lnRef idx="2">
+                <a:schemeClr val="accent1">
+                  <a:shade val="50000"/>
+                </a:schemeClr>
+              </a:lnRef>
+              <a:fillRef idx="1">
+                <a:schemeClr val="accent1"/>
+              </a:fillRef>
+              <a:effectRef idx="0">
+                <a:schemeClr val="accent1"/>
+              </a:effectRef>
+              <a:fontRef idx="minor">
+                <a:schemeClr val="lt1"/>
+              </a:fontRef>
+            </p:style>
+            <p:txBody>
+              <a:bodyPr rtlCol="0" anchor="ctr"/>
+              <a:lstStyle/>
+              <a:p>
+                <a:pPr algn="ctr"/>
+                <a:endParaRPr lang="de-DE"/>
+              </a:p>
+            </p:txBody>
+          </p:sp>
+          <p:sp>
+            <p:nvSpPr>
+              <p:cNvPr id="13" name="Gleichschenkliges Dreieck 12">
+                <a:extLst>
+                  <a:ext uri="{FF2B5EF4-FFF2-40B4-BE49-F238E27FC236}">
+                    <a16:creationId xmlns:a16="http://schemas.microsoft.com/office/drawing/2014/main" id="{79E143D4-3582-4C6E-8EA3-FDB1F6A9F906}"/>
+                  </a:ext>
+                </a:extLst>
+              </p:cNvPr>
+              <p:cNvSpPr/>
+              <p:nvPr/>
+            </p:nvSpPr>
+            <p:spPr>
+              <a:xfrm>
+                <a:off x="2832872" y="876736"/>
+                <a:ext cx="334692" cy="195970"/>
+              </a:xfrm>
+              <a:prstGeom prst="triangle">
+                <a:avLst/>
+              </a:prstGeom>
+              <a:grpFill/>
+              <a:ln>
+                <a:solidFill>
+                  <a:schemeClr val="tx1"/>
+                </a:solidFill>
+              </a:ln>
+            </p:spPr>
+            <p:style>
+              <a:lnRef idx="2">
+                <a:schemeClr val="accent1">
+                  <a:shade val="50000"/>
+                </a:schemeClr>
+              </a:lnRef>
+              <a:fillRef idx="1">
+                <a:schemeClr val="accent1"/>
+              </a:fillRef>
+              <a:effectRef idx="0">
+                <a:schemeClr val="accent1"/>
+              </a:effectRef>
+              <a:fontRef idx="minor">
+                <a:schemeClr val="lt1"/>
+              </a:fontRef>
+            </p:style>
+            <p:txBody>
+              <a:bodyPr rtlCol="0" anchor="ctr"/>
+              <a:lstStyle/>
+              <a:p>
+                <a:pPr algn="ctr"/>
+                <a:endParaRPr lang="de-DE"/>
+              </a:p>
+            </p:txBody>
+          </p:sp>
+        </p:grpSp>
+      </p:grpSp>
+      <p:sp>
+        <p:nvSpPr>
+          <p:cNvPr id="15" name="Textfeld 14">
+            <a:extLst>
+              <a:ext uri="{FF2B5EF4-FFF2-40B4-BE49-F238E27FC236}">
+                <a16:creationId xmlns:a16="http://schemas.microsoft.com/office/drawing/2014/main" id="{A5BDC390-18D8-48C9-9745-FF4E1BF3588D}"/>
+              </a:ext>
+            </a:extLst>
+          </p:cNvPr>
+          <p:cNvSpPr txBox="1"/>
+          <p:nvPr/>
+        </p:nvSpPr>
+        <p:spPr>
+          <a:xfrm rot="1226112">
+            <a:off x="2908652" y="2844224"/>
+            <a:ext cx="6374694" cy="1169551"/>
+          </a:xfrm>
+          <a:prstGeom prst="rect">
+            <a:avLst/>
+          </a:prstGeom>
+          <a:noFill/>
+        </p:spPr>
+        <p:txBody>
+          <a:bodyPr wrap="none" rtlCol="0">
+            <a:spAutoFit/>
+          </a:bodyPr>
+          <a:lstStyle/>
+          <a:p>
+            <a:r>
+              <a:rPr lang="de-DE" sz="7000" dirty="0">
+                <a:solidFill>
+                  <a:schemeClr val="bg1">
+                    <a:lumMod val="65000"/>
+                  </a:schemeClr>
+                </a:solidFill>
+              </a:rPr>
+              <a:t>Jeweilige Ansicht</a:t>
+            </a:r>
+          </a:p>
+        </p:txBody>
+      </p:sp>
+      <p:cxnSp>
+        <p:nvCxnSpPr>
+          <p:cNvPr id="17" name="Gerader Verbinder 16">
+            <a:extLst>
+              <a:ext uri="{FF2B5EF4-FFF2-40B4-BE49-F238E27FC236}">
+                <a16:creationId xmlns:a16="http://schemas.microsoft.com/office/drawing/2014/main" id="{785465D6-1709-4126-BE06-38E710F1D0DD}"/>
+              </a:ext>
+            </a:extLst>
+          </p:cNvPr>
+          <p:cNvCxnSpPr>
+            <a:cxnSpLocks/>
+          </p:cNvCxnSpPr>
+          <p:nvPr/>
+        </p:nvCxnSpPr>
+        <p:spPr>
+          <a:xfrm flipV="1">
+            <a:off x="1242389" y="8679"/>
+            <a:ext cx="0" cy="1062000"/>
+          </a:xfrm>
+          <a:prstGeom prst="line">
+            <a:avLst/>
+          </a:prstGeom>
+          <a:ln w="12700">
+            <a:solidFill>
+              <a:schemeClr val="tx1"/>
+            </a:solidFill>
+          </a:ln>
+        </p:spPr>
+        <p:style>
+          <a:lnRef idx="1">
+            <a:schemeClr val="accent1"/>
+          </a:lnRef>
+          <a:fillRef idx="0">
+            <a:schemeClr val="accent1"/>
+          </a:fillRef>
+          <a:effectRef idx="0">
+            <a:schemeClr val="accent1"/>
+          </a:effectRef>
+          <a:fontRef idx="minor">
+            <a:schemeClr val="tx1"/>
+          </a:fontRef>
+        </p:style>
+      </p:cxnSp>
+      <p:cxnSp>
+        <p:nvCxnSpPr>
+          <p:cNvPr id="21" name="Gerader Verbinder 20">
+            <a:extLst>
+              <a:ext uri="{FF2B5EF4-FFF2-40B4-BE49-F238E27FC236}">
+                <a16:creationId xmlns:a16="http://schemas.microsoft.com/office/drawing/2014/main" id="{1788EA98-8C08-4306-8FF0-B4938B666CF0}"/>
+              </a:ext>
+            </a:extLst>
+          </p:cNvPr>
+          <p:cNvCxnSpPr>
+            <a:cxnSpLocks/>
+          </p:cNvCxnSpPr>
+          <p:nvPr/>
+        </p:nvCxnSpPr>
+        <p:spPr>
+          <a:xfrm flipV="1">
+            <a:off x="10982172" y="0"/>
+            <a:ext cx="0" cy="1062002"/>
+          </a:xfrm>
+          <a:prstGeom prst="line">
+            <a:avLst/>
+          </a:prstGeom>
+          <a:ln w="12700">
+            <a:solidFill>
+              <a:schemeClr val="tx1"/>
+            </a:solidFill>
+          </a:ln>
+        </p:spPr>
+        <p:style>
+          <a:lnRef idx="1">
+            <a:schemeClr val="accent1"/>
+          </a:lnRef>
+          <a:fillRef idx="0">
+            <a:schemeClr val="accent1"/>
+          </a:fillRef>
+          <a:effectRef idx="0">
+            <a:schemeClr val="accent1"/>
+          </a:effectRef>
+          <a:fontRef idx="minor">
+            <a:schemeClr val="tx1"/>
+          </a:fontRef>
+        </p:style>
+      </p:cxnSp>
+      <p:grpSp>
+        <p:nvGrpSpPr>
+          <p:cNvPr id="36" name="Gruppieren 35">
+            <a:extLst>
+              <a:ext uri="{FF2B5EF4-FFF2-40B4-BE49-F238E27FC236}">
+                <a16:creationId xmlns:a16="http://schemas.microsoft.com/office/drawing/2014/main" id="{16C41397-2FDF-4112-AEEB-2938087E17DE}"/>
+              </a:ext>
+            </a:extLst>
+          </p:cNvPr>
+          <p:cNvGrpSpPr/>
+          <p:nvPr/>
+        </p:nvGrpSpPr>
+        <p:grpSpPr>
+          <a:xfrm>
+            <a:off x="11128083" y="108791"/>
+            <a:ext cx="934697" cy="861774"/>
+            <a:chOff x="9420064" y="828029"/>
+            <a:chExt cx="587016" cy="574243"/>
+          </a:xfrm>
+        </p:grpSpPr>
+        <p:sp>
+          <p:nvSpPr>
+            <p:cNvPr id="23" name="Textfeld 22">
+              <a:extLst>
+                <a:ext uri="{FF2B5EF4-FFF2-40B4-BE49-F238E27FC236}">
+                  <a16:creationId xmlns:a16="http://schemas.microsoft.com/office/drawing/2014/main" id="{23EA0142-78DB-4CAC-ABAA-C51BAD4A770D}"/>
+                </a:ext>
+              </a:extLst>
+            </p:cNvPr>
+            <p:cNvSpPr txBox="1">
+              <a:spLocks/>
+            </p:cNvSpPr>
+            <p:nvPr/>
+          </p:nvSpPr>
+          <p:spPr>
+            <a:xfrm>
+              <a:off x="9420064" y="839371"/>
+              <a:ext cx="587016" cy="539997"/>
+            </a:xfrm>
+            <a:prstGeom prst="rect">
+              <a:avLst/>
+            </a:prstGeom>
+            <a:solidFill>
+              <a:schemeClr val="bg1">
+                <a:lumMod val="85000"/>
+              </a:schemeClr>
+            </a:solidFill>
+            <a:ln>
+              <a:solidFill>
+                <a:schemeClr val="tx1"/>
+              </a:solidFill>
+            </a:ln>
+          </p:spPr>
+          <p:txBody>
+            <a:bodyPr wrap="square" rtlCol="0" anchor="ctr" anchorCtr="0">
+              <a:noAutofit/>
+            </a:bodyPr>
+            <a:lstStyle/>
+            <a:p>
+              <a:pPr algn="ctr"/>
+              <a:endParaRPr lang="de-DE" dirty="0"/>
+            </a:p>
+          </p:txBody>
+        </p:sp>
+        <p:sp>
+          <p:nvSpPr>
+            <p:cNvPr id="24" name="Textfeld 23">
+              <a:extLst>
+                <a:ext uri="{FF2B5EF4-FFF2-40B4-BE49-F238E27FC236}">
+                  <a16:creationId xmlns:a16="http://schemas.microsoft.com/office/drawing/2014/main" id="{65A7106A-35AC-4400-BB32-F9F4546D9B78}"/>
+                </a:ext>
+              </a:extLst>
+            </p:cNvPr>
+            <p:cNvSpPr txBox="1"/>
+            <p:nvPr/>
+          </p:nvSpPr>
+          <p:spPr>
+            <a:xfrm>
+              <a:off x="9498913" y="828029"/>
+              <a:ext cx="429069" cy="574243"/>
+            </a:xfrm>
+            <a:prstGeom prst="rect">
+              <a:avLst/>
+            </a:prstGeom>
+            <a:noFill/>
+          </p:spPr>
+          <p:txBody>
+            <a:bodyPr wrap="none" rtlCol="0">
+              <a:spAutoFit/>
+            </a:bodyPr>
+            <a:lstStyle/>
+            <a:p>
+              <a:r>
+                <a:rPr lang="de-DE" sz="5000" dirty="0">
+                  <a:solidFill>
+                    <a:schemeClr val="tx1">
+                      <a:lumMod val="75000"/>
+                      <a:lumOff val="25000"/>
+                    </a:schemeClr>
+                  </a:solidFill>
+                  <a:latin typeface="Arial Black" panose="020B0A04020102020204" pitchFamily="34" charset="0"/>
+                </a:rPr>
+                <a:t>X</a:t>
+              </a:r>
+            </a:p>
+          </p:txBody>
+        </p:sp>
+      </p:grpSp>
+      <p:cxnSp>
+        <p:nvCxnSpPr>
+          <p:cNvPr id="28" name="Gerader Verbinder 27">
+            <a:extLst>
+              <a:ext uri="{FF2B5EF4-FFF2-40B4-BE49-F238E27FC236}">
+                <a16:creationId xmlns:a16="http://schemas.microsoft.com/office/drawing/2014/main" id="{BA701891-895F-461C-BB23-D1FAEBCFAC0C}"/>
+              </a:ext>
+            </a:extLst>
+          </p:cNvPr>
+          <p:cNvCxnSpPr>
+            <a:cxnSpLocks/>
+          </p:cNvCxnSpPr>
+          <p:nvPr/>
+        </p:nvCxnSpPr>
+        <p:spPr>
+          <a:xfrm>
+            <a:off x="0" y="6452330"/>
+            <a:ext cx="12192000" cy="0"/>
+          </a:xfrm>
+          <a:prstGeom prst="line">
+            <a:avLst/>
+          </a:prstGeom>
+          <a:ln w="12700">
+            <a:solidFill>
+              <a:schemeClr val="tx1"/>
+            </a:solidFill>
+          </a:ln>
+        </p:spPr>
+        <p:style>
+          <a:lnRef idx="1">
+            <a:schemeClr val="accent1"/>
+          </a:lnRef>
+          <a:fillRef idx="0">
+            <a:schemeClr val="accent1"/>
+          </a:fillRef>
+          <a:effectRef idx="0">
+            <a:schemeClr val="accent1"/>
+          </a:effectRef>
+          <a:fontRef idx="minor">
+            <a:schemeClr val="tx1"/>
+          </a:fontRef>
+        </p:style>
+      </p:cxnSp>
+      <p:sp>
+        <p:nvSpPr>
+          <p:cNvPr id="29" name="Textfeld 28">
+            <a:extLst>
+              <a:ext uri="{FF2B5EF4-FFF2-40B4-BE49-F238E27FC236}">
+                <a16:creationId xmlns:a16="http://schemas.microsoft.com/office/drawing/2014/main" id="{FADC3808-8AF8-452C-9B36-33F0CC378649}"/>
+              </a:ext>
+            </a:extLst>
+          </p:cNvPr>
+          <p:cNvSpPr txBox="1"/>
+          <p:nvPr/>
+        </p:nvSpPr>
+        <p:spPr>
+          <a:xfrm>
+            <a:off x="0" y="6435329"/>
+            <a:ext cx="2225318" cy="415696"/>
+          </a:xfrm>
+          <a:prstGeom prst="rect">
+            <a:avLst/>
+          </a:prstGeom>
+          <a:noFill/>
+        </p:spPr>
+        <p:txBody>
+          <a:bodyPr wrap="none" rtlCol="0">
+            <a:spAutoFit/>
+          </a:bodyPr>
+          <a:lstStyle/>
+          <a:p>
+            <a:r>
+              <a:rPr lang="de-DE" sz="2000" dirty="0"/>
+              <a:t>Temperatur: XXX °C</a:t>
+            </a:r>
+          </a:p>
+        </p:txBody>
+      </p:sp>
+      <p:sp>
+        <p:nvSpPr>
+          <p:cNvPr id="30" name="Textfeld 29">
+            <a:extLst>
+              <a:ext uri="{FF2B5EF4-FFF2-40B4-BE49-F238E27FC236}">
+                <a16:creationId xmlns:a16="http://schemas.microsoft.com/office/drawing/2014/main" id="{019FBC9F-E685-4140-A909-058D41998AC4}"/>
+              </a:ext>
+            </a:extLst>
+          </p:cNvPr>
+          <p:cNvSpPr txBox="1"/>
+          <p:nvPr/>
+        </p:nvSpPr>
+        <p:spPr>
+          <a:xfrm>
+            <a:off x="5214687" y="6435326"/>
+            <a:ext cx="2265240" cy="415696"/>
+          </a:xfrm>
+          <a:prstGeom prst="rect">
+            <a:avLst/>
+          </a:prstGeom>
+          <a:noFill/>
+        </p:spPr>
+        <p:txBody>
+          <a:bodyPr wrap="none" rtlCol="0">
+            <a:spAutoFit/>
+          </a:bodyPr>
+          <a:lstStyle/>
+          <a:p>
+            <a:r>
+              <a:rPr lang="de-DE" sz="2000" dirty="0"/>
+              <a:t>Verbunden / Offline</a:t>
+            </a:r>
+          </a:p>
+        </p:txBody>
+      </p:sp>
+      <p:sp>
+        <p:nvSpPr>
+          <p:cNvPr id="31" name="Textfeld 30">
+            <a:extLst>
+              <a:ext uri="{FF2B5EF4-FFF2-40B4-BE49-F238E27FC236}">
+                <a16:creationId xmlns:a16="http://schemas.microsoft.com/office/drawing/2014/main" id="{64D7A1FB-5719-4331-BB98-D1AA21033DBD}"/>
+              </a:ext>
+            </a:extLst>
+          </p:cNvPr>
+          <p:cNvSpPr txBox="1"/>
+          <p:nvPr/>
+        </p:nvSpPr>
+        <p:spPr>
+          <a:xfrm>
+            <a:off x="10146314" y="6463712"/>
+            <a:ext cx="2110458" cy="415696"/>
+          </a:xfrm>
+          <a:prstGeom prst="rect">
+            <a:avLst/>
+          </a:prstGeom>
+          <a:noFill/>
+        </p:spPr>
+        <p:txBody>
+          <a:bodyPr wrap="none" rtlCol="0">
+            <a:spAutoFit/>
+          </a:bodyPr>
+          <a:lstStyle/>
+          <a:p>
+            <a:r>
+              <a:rPr lang="de-DE" sz="2000" dirty="0"/>
+              <a:t>Feuchtigkeit: XX %</a:t>
+            </a:r>
+          </a:p>
+        </p:txBody>
+      </p:sp>
+      <p:sp>
+        <p:nvSpPr>
+          <p:cNvPr id="37" name="Textfeld 36">
+            <a:extLst>
+              <a:ext uri="{FF2B5EF4-FFF2-40B4-BE49-F238E27FC236}">
+                <a16:creationId xmlns:a16="http://schemas.microsoft.com/office/drawing/2014/main" id="{CD33B461-1087-4F81-8668-33CA711DA81C}"/>
+              </a:ext>
+            </a:extLst>
+          </p:cNvPr>
+          <p:cNvSpPr txBox="1"/>
+          <p:nvPr/>
+        </p:nvSpPr>
+        <p:spPr>
+          <a:xfrm>
+            <a:off x="4312946" y="8897"/>
+            <a:ext cx="3559949" cy="707886"/>
+          </a:xfrm>
+          <a:prstGeom prst="rect">
+            <a:avLst/>
+          </a:prstGeom>
+          <a:noFill/>
+        </p:spPr>
+        <p:txBody>
+          <a:bodyPr wrap="none" rtlCol="0">
+            <a:spAutoFit/>
+          </a:bodyPr>
+          <a:lstStyle/>
+          <a:p>
+            <a:pPr algn="ctr"/>
+            <a:r>
+              <a:rPr lang="de-DE" sz="4000" dirty="0">
+                <a:solidFill>
+                  <a:schemeClr val="bg1">
+                    <a:lumMod val="65000"/>
+                  </a:schemeClr>
+                </a:solidFill>
+              </a:rPr>
+              <a:t>Titel der Ansicht</a:t>
+            </a:r>
+          </a:p>
+        </p:txBody>
+      </p:sp>
+      <p:sp>
+        <p:nvSpPr>
+          <p:cNvPr id="38" name="Textfeld 37">
+            <a:extLst>
+              <a:ext uri="{FF2B5EF4-FFF2-40B4-BE49-F238E27FC236}">
+                <a16:creationId xmlns:a16="http://schemas.microsoft.com/office/drawing/2014/main" id="{E321EB3B-4147-44B1-B5BC-F40A6082F986}"/>
+              </a:ext>
+            </a:extLst>
+          </p:cNvPr>
+          <p:cNvSpPr txBox="1"/>
+          <p:nvPr/>
+        </p:nvSpPr>
+        <p:spPr>
+          <a:xfrm>
+            <a:off x="4164414" y="677598"/>
+            <a:ext cx="3863173" cy="400110"/>
+          </a:xfrm>
+          <a:prstGeom prst="rect">
+            <a:avLst/>
+          </a:prstGeom>
+          <a:noFill/>
+        </p:spPr>
+        <p:txBody>
+          <a:bodyPr wrap="none" rtlCol="0">
+            <a:spAutoFit/>
+          </a:bodyPr>
+          <a:lstStyle/>
+          <a:p>
+            <a:pPr algn="ctr"/>
+            <a:r>
+              <a:rPr lang="de-DE" sz="2000" dirty="0">
+                <a:solidFill>
+                  <a:schemeClr val="bg1">
+                    <a:lumMod val="65000"/>
+                  </a:schemeClr>
+                </a:solidFill>
+              </a:rPr>
+              <a:t>(</a:t>
+            </a:r>
+            <a:r>
+              <a:rPr lang="de-DE" sz="2000" dirty="0">
+                <a:solidFill>
+                  <a:schemeClr val="bg1">
+                    <a:lumMod val="65000"/>
+                  </a:schemeClr>
+                </a:solidFill>
+                <a:sym typeface="Wingdings" panose="05000000000000000000" pitchFamily="2" charset="2"/>
+              </a:rPr>
+              <a:t> </a:t>
+            </a:r>
+            <a:r>
+              <a:rPr lang="de-DE" sz="2000" dirty="0">
+                <a:solidFill>
+                  <a:schemeClr val="bg1">
+                    <a:lumMod val="65000"/>
+                  </a:schemeClr>
+                </a:solidFill>
+              </a:rPr>
+              <a:t>Navigation in der Hauptansicht)</a:t>
+            </a:r>
+          </a:p>
+        </p:txBody>
+      </p:sp>
+    </p:spTree>
+    <p:extLst>
+      <p:ext uri="{BB962C8B-B14F-4D97-AF65-F5344CB8AC3E}">
+        <p14:creationId xmlns:p14="http://schemas.microsoft.com/office/powerpoint/2010/main" val="123917995"/>
+      </p:ext>
+    </p:extLst>
+  </p:cSld>
+  <p:clrMapOvr>
+    <a:masterClrMapping/>
+  </p:clrMapOvr>
+</p:sld>
+</file>
+
+<file path=ppt/slides/slide6.xml><?xml version="1.0" encoding="utf-8"?>
 <p:sld xmlns:a="http://schemas.openxmlformats.org/drawingml/2006/main" xmlns:r="http://schemas.openxmlformats.org/officeDocument/2006/relationships" xmlns:p="http://schemas.openxmlformats.org/presentationml/2006/main">
   <p:cSld>
     <p:spTree>

</xml_diff>

<commit_message>
Ordner CustomControls hinzugefügt Dieser enthält DarkMode, ImageButton und Slider
</commit_message>
<xml_diff>
--- a/Dokumentation/dokumentation.pptx
+++ b/Dokumentation/dokumentation.pptx
@@ -5,15 +5,16 @@
     <p:sldMasterId id="2147483648" r:id="rId1"/>
   </p:sldMasterIdLst>
   <p:notesMasterIdLst>
-    <p:notesMasterId r:id="rId8"/>
+    <p:notesMasterId r:id="rId9"/>
   </p:notesMasterIdLst>
   <p:sldIdLst>
     <p:sldId id="257" r:id="rId2"/>
-    <p:sldId id="256" r:id="rId3"/>
-    <p:sldId id="258" r:id="rId4"/>
-    <p:sldId id="259" r:id="rId5"/>
-    <p:sldId id="261" r:id="rId6"/>
-    <p:sldId id="260" r:id="rId7"/>
+    <p:sldId id="262" r:id="rId3"/>
+    <p:sldId id="256" r:id="rId4"/>
+    <p:sldId id="258" r:id="rId5"/>
+    <p:sldId id="259" r:id="rId6"/>
+    <p:sldId id="261" r:id="rId7"/>
+    <p:sldId id="260" r:id="rId8"/>
   </p:sldIdLst>
   <p:sldSz cx="12192000" cy="6858000"/>
   <p:notesSz cx="6858000" cy="9144000"/>
@@ -214,7 +215,7 @@
           <a:p>
             <a:fld id="{F1CAF840-27E4-4239-B411-7319B5DE6B82}" type="datetimeFigureOut">
               <a:rPr lang="de-DE" smtClean="0"/>
-              <a:t>08.05.2020</a:t>
+              <a:t>11.05.2020</a:t>
             </a:fld>
             <a:endParaRPr lang="de-DE"/>
           </a:p>
@@ -628,7 +629,7 @@
           <a:p>
             <a:fld id="{723101A8-F6CA-47F5-8A07-6FC06EC7AF15}" type="datetimeFigureOut">
               <a:rPr lang="de-DE" smtClean="0"/>
-              <a:t>08.05.2020</a:t>
+              <a:t>11.05.2020</a:t>
             </a:fld>
             <a:endParaRPr lang="de-DE"/>
           </a:p>
@@ -826,7 +827,7 @@
           <a:p>
             <a:fld id="{723101A8-F6CA-47F5-8A07-6FC06EC7AF15}" type="datetimeFigureOut">
               <a:rPr lang="de-DE" smtClean="0"/>
-              <a:t>08.05.2020</a:t>
+              <a:t>11.05.2020</a:t>
             </a:fld>
             <a:endParaRPr lang="de-DE"/>
           </a:p>
@@ -1034,7 +1035,7 @@
           <a:p>
             <a:fld id="{723101A8-F6CA-47F5-8A07-6FC06EC7AF15}" type="datetimeFigureOut">
               <a:rPr lang="de-DE" smtClean="0"/>
-              <a:t>08.05.2020</a:t>
+              <a:t>11.05.2020</a:t>
             </a:fld>
             <a:endParaRPr lang="de-DE"/>
           </a:p>
@@ -1232,7 +1233,7 @@
           <a:p>
             <a:fld id="{723101A8-F6CA-47F5-8A07-6FC06EC7AF15}" type="datetimeFigureOut">
               <a:rPr lang="de-DE" smtClean="0"/>
-              <a:t>08.05.2020</a:t>
+              <a:t>11.05.2020</a:t>
             </a:fld>
             <a:endParaRPr lang="de-DE"/>
           </a:p>
@@ -1507,7 +1508,7 @@
           <a:p>
             <a:fld id="{723101A8-F6CA-47F5-8A07-6FC06EC7AF15}" type="datetimeFigureOut">
               <a:rPr lang="de-DE" smtClean="0"/>
-              <a:t>08.05.2020</a:t>
+              <a:t>11.05.2020</a:t>
             </a:fld>
             <a:endParaRPr lang="de-DE"/>
           </a:p>
@@ -1772,7 +1773,7 @@
           <a:p>
             <a:fld id="{723101A8-F6CA-47F5-8A07-6FC06EC7AF15}" type="datetimeFigureOut">
               <a:rPr lang="de-DE" smtClean="0"/>
-              <a:t>08.05.2020</a:t>
+              <a:t>11.05.2020</a:t>
             </a:fld>
             <a:endParaRPr lang="de-DE"/>
           </a:p>
@@ -2184,7 +2185,7 @@
           <a:p>
             <a:fld id="{723101A8-F6CA-47F5-8A07-6FC06EC7AF15}" type="datetimeFigureOut">
               <a:rPr lang="de-DE" smtClean="0"/>
-              <a:t>08.05.2020</a:t>
+              <a:t>11.05.2020</a:t>
             </a:fld>
             <a:endParaRPr lang="de-DE"/>
           </a:p>
@@ -2325,7 +2326,7 @@
           <a:p>
             <a:fld id="{723101A8-F6CA-47F5-8A07-6FC06EC7AF15}" type="datetimeFigureOut">
               <a:rPr lang="de-DE" smtClean="0"/>
-              <a:t>08.05.2020</a:t>
+              <a:t>11.05.2020</a:t>
             </a:fld>
             <a:endParaRPr lang="de-DE"/>
           </a:p>
@@ -2438,7 +2439,7 @@
           <a:p>
             <a:fld id="{723101A8-F6CA-47F5-8A07-6FC06EC7AF15}" type="datetimeFigureOut">
               <a:rPr lang="de-DE" smtClean="0"/>
-              <a:t>08.05.2020</a:t>
+              <a:t>11.05.2020</a:t>
             </a:fld>
             <a:endParaRPr lang="de-DE"/>
           </a:p>
@@ -2749,7 +2750,7 @@
           <a:p>
             <a:fld id="{723101A8-F6CA-47F5-8A07-6FC06EC7AF15}" type="datetimeFigureOut">
               <a:rPr lang="de-DE" smtClean="0"/>
-              <a:t>08.05.2020</a:t>
+              <a:t>11.05.2020</a:t>
             </a:fld>
             <a:endParaRPr lang="de-DE"/>
           </a:p>
@@ -3037,7 +3038,7 @@
           <a:p>
             <a:fld id="{723101A8-F6CA-47F5-8A07-6FC06EC7AF15}" type="datetimeFigureOut">
               <a:rPr lang="de-DE" smtClean="0"/>
-              <a:t>08.05.2020</a:t>
+              <a:t>11.05.2020</a:t>
             </a:fld>
             <a:endParaRPr lang="de-DE"/>
           </a:p>
@@ -3278,7 +3279,7 @@
           <a:p>
             <a:fld id="{723101A8-F6CA-47F5-8A07-6FC06EC7AF15}" type="datetimeFigureOut">
               <a:rPr lang="de-DE" smtClean="0"/>
-              <a:t>08.05.2020</a:t>
+              <a:t>11.05.2020</a:t>
             </a:fld>
             <a:endParaRPr lang="de-DE"/>
           </a:p>
@@ -3981,6 +3982,71 @@
           <a:chExt cx="0" cy="0"/>
         </a:xfrm>
       </p:grpSpPr>
+      <p:pic>
+        <p:nvPicPr>
+          <p:cNvPr id="5" name="Inhaltsplatzhalter 4">
+            <a:extLst>
+              <a:ext uri="{FF2B5EF4-FFF2-40B4-BE49-F238E27FC236}">
+                <a16:creationId xmlns:a16="http://schemas.microsoft.com/office/drawing/2014/main" id="{51B2CDB4-F709-4AB4-A844-8392B19683B2}"/>
+              </a:ext>
+            </a:extLst>
+          </p:cNvPr>
+          <p:cNvPicPr>
+            <a:picLocks noGrp="1" noChangeAspect="1"/>
+          </p:cNvPicPr>
+          <p:nvPr>
+            <p:ph idx="1"/>
+          </p:nvPr>
+        </p:nvPicPr>
+        <p:blipFill>
+          <a:blip r:embed="rId2">
+            <a:extLst>
+              <a:ext uri="{28A0092B-C50C-407E-A947-70E740481C1C}">
+                <a14:useLocalDpi xmlns:a14="http://schemas.microsoft.com/office/drawing/2010/main" val="0"/>
+              </a:ext>
+            </a:extLst>
+          </a:blip>
+          <a:stretch>
+            <a:fillRect/>
+          </a:stretch>
+        </p:blipFill>
+        <p:spPr>
+          <a:xfrm>
+            <a:off x="2068664" y="0"/>
+            <a:ext cx="8054671" cy="6890520"/>
+          </a:xfrm>
+        </p:spPr>
+      </p:pic>
+    </p:spTree>
+    <p:extLst>
+      <p:ext uri="{BB962C8B-B14F-4D97-AF65-F5344CB8AC3E}">
+        <p14:creationId xmlns:p14="http://schemas.microsoft.com/office/powerpoint/2010/main" val="919246842"/>
+      </p:ext>
+    </p:extLst>
+  </p:cSld>
+  <p:clrMapOvr>
+    <a:masterClrMapping/>
+  </p:clrMapOvr>
+</p:sld>
+</file>
+
+<file path=ppt/slides/slide3.xml><?xml version="1.0" encoding="utf-8"?>
+<p:sld xmlns:a="http://schemas.openxmlformats.org/drawingml/2006/main" xmlns:r="http://schemas.openxmlformats.org/officeDocument/2006/relationships" xmlns:p="http://schemas.openxmlformats.org/presentationml/2006/main">
+  <p:cSld>
+    <p:spTree>
+      <p:nvGrpSpPr>
+        <p:cNvPr id="1" name=""/>
+        <p:cNvGrpSpPr/>
+        <p:nvPr/>
+      </p:nvGrpSpPr>
+      <p:grpSpPr>
+        <a:xfrm>
+          <a:off x="0" y="0"/>
+          <a:ext cx="0" cy="0"/>
+          <a:chOff x="0" y="0"/>
+          <a:chExt cx="0" cy="0"/>
+        </a:xfrm>
+      </p:grpSpPr>
       <p:sp>
         <p:nvSpPr>
           <p:cNvPr id="3" name="Untertitel 2">
@@ -5199,7 +5265,7 @@
 </p:sld>
 </file>
 
-<file path=ppt/slides/slide3.xml><?xml version="1.0" encoding="utf-8"?>
+<file path=ppt/slides/slide4.xml><?xml version="1.0" encoding="utf-8"?>
 <p:sld xmlns:a="http://schemas.openxmlformats.org/drawingml/2006/main" xmlns:r="http://schemas.openxmlformats.org/officeDocument/2006/relationships" xmlns:p="http://schemas.openxmlformats.org/presentationml/2006/main">
   <p:cSld>
     <p:spTree>
@@ -5300,7 +5366,7 @@
 </p:sld>
 </file>
 
-<file path=ppt/slides/slide4.xml><?xml version="1.0" encoding="utf-8"?>
+<file path=ppt/slides/slide5.xml><?xml version="1.0" encoding="utf-8"?>
 <p:sld xmlns:a="http://schemas.openxmlformats.org/drawingml/2006/main" xmlns:r="http://schemas.openxmlformats.org/officeDocument/2006/relationships" xmlns:p="http://schemas.openxmlformats.org/presentationml/2006/main">
   <p:cSld>
     <p:spTree>
@@ -6218,7 +6284,7 @@
 </p:sld>
 </file>
 
-<file path=ppt/slides/slide5.xml><?xml version="1.0" encoding="utf-8"?>
+<file path=ppt/slides/slide6.xml><?xml version="1.0" encoding="utf-8"?>
 <p:sld xmlns:a="http://schemas.openxmlformats.org/drawingml/2006/main" xmlns:r="http://schemas.openxmlformats.org/officeDocument/2006/relationships" xmlns:p="http://schemas.openxmlformats.org/presentationml/2006/main">
   <p:cSld>
     <p:spTree>
@@ -7027,7 +7093,7 @@
 </p:sld>
 </file>
 
-<file path=ppt/slides/slide6.xml><?xml version="1.0" encoding="utf-8"?>
+<file path=ppt/slides/slide7.xml><?xml version="1.0" encoding="utf-8"?>
 <p:sld xmlns:a="http://schemas.openxmlformats.org/drawingml/2006/main" xmlns:r="http://schemas.openxmlformats.org/officeDocument/2006/relationships" xmlns:p="http://schemas.openxmlformats.org/presentationml/2006/main">
   <p:cSld>
     <p:spTree>

</xml_diff>